<commit_message>
Added splashscreen and icon
</commit_message>
<xml_diff>
--- a/MM Class Hierarchy.pptx
+++ b/MM Class Hierarchy.pptx
@@ -3057,11 +3057,7 @@
             </a:r>
             <a:r>
               <a:rPr lang="en-US" sz="1200" dirty="0" smtClean="0"/>
-              <a:t>(): </a:t>
-            </a:r>
-            <a:r>
-              <a:rPr lang="en-US" sz="1200" dirty="0" smtClean="0"/>
-              <a:t>void</a:t>
+              <a:t>(): void</a:t>
             </a:r>
           </a:p>
           <a:p>
@@ -3155,11 +3151,7 @@
             </a:pPr>
             <a:r>
               <a:rPr lang="en-US" sz="1200" dirty="0" smtClean="0"/>
-              <a:t>colour</a:t>
-            </a:r>
-            <a:r>
-              <a:rPr lang="en-US" sz="1200" dirty="0" smtClean="0"/>
-              <a:t>: </a:t>
+              <a:t>colour: </a:t>
             </a:r>
             <a:r>
               <a:rPr lang="en-US" sz="1200" dirty="0" err="1"/>
@@ -3477,7 +3469,7 @@
         </p:nvSpPr>
         <p:spPr>
           <a:xfrm>
-            <a:off x="4059401" y="7577947"/>
+            <a:off x="1809734" y="7690770"/>
             <a:ext cx="1273810" cy="276999"/>
           </a:xfrm>
           <a:prstGeom prst="rect">
@@ -3522,7 +3514,7 @@
         </p:nvSpPr>
         <p:spPr>
           <a:xfrm>
-            <a:off x="8837775" y="8083738"/>
+            <a:off x="6978633" y="7890260"/>
             <a:ext cx="1273810" cy="276999"/>
           </a:xfrm>
           <a:prstGeom prst="rect">
@@ -3567,7 +3559,7 @@
         </p:nvSpPr>
         <p:spPr>
           <a:xfrm>
-            <a:off x="8113875" y="9089117"/>
+            <a:off x="6254733" y="8895639"/>
             <a:ext cx="1273810" cy="276999"/>
           </a:xfrm>
           <a:prstGeom prst="rect">
@@ -3612,7 +3604,7 @@
         </p:nvSpPr>
         <p:spPr>
           <a:xfrm>
-            <a:off x="9709630" y="9090231"/>
+            <a:off x="7850488" y="8896753"/>
             <a:ext cx="1273810" cy="276999"/>
           </a:xfrm>
           <a:prstGeom prst="rect">
@@ -3657,7 +3649,7 @@
         </p:nvSpPr>
         <p:spPr>
           <a:xfrm>
-            <a:off x="3123411" y="8851732"/>
+            <a:off x="873744" y="8964555"/>
             <a:ext cx="927100" cy="276999"/>
           </a:xfrm>
           <a:prstGeom prst="rect">
@@ -3702,7 +3694,7 @@
         </p:nvSpPr>
         <p:spPr>
           <a:xfrm>
-            <a:off x="5333211" y="8837792"/>
+            <a:off x="3083544" y="8950615"/>
             <a:ext cx="927100" cy="276999"/>
           </a:xfrm>
           <a:prstGeom prst="rect">
@@ -3747,7 +3739,7 @@
         </p:nvSpPr>
         <p:spPr>
           <a:xfrm>
-            <a:off x="4228311" y="8837791"/>
+            <a:off x="1978644" y="8950614"/>
             <a:ext cx="927100" cy="276999"/>
           </a:xfrm>
           <a:prstGeom prst="rect">
@@ -3841,15 +3833,7 @@
             </a:pPr>
             <a:r>
               <a:rPr lang="en-US" sz="1200" dirty="0" smtClean="0"/>
-              <a:t>disguised</a:t>
-            </a:r>
-            <a:r>
-              <a:rPr lang="en-US" sz="1200" dirty="0" smtClean="0"/>
-              <a:t>: </a:t>
-            </a:r>
-            <a:r>
-              <a:rPr lang="en-US" sz="1200" dirty="0" smtClean="0"/>
-              <a:t>Boolean</a:t>
+              <a:t>disguised: Boolean</a:t>
             </a:r>
           </a:p>
           <a:p>
@@ -3859,11 +3843,7 @@
             </a:pPr>
             <a:r>
               <a:rPr lang="en-US" sz="1200" dirty="0" smtClean="0"/>
-              <a:t>w</a:t>
-            </a:r>
-            <a:r>
-              <a:rPr lang="en-US" sz="1200" dirty="0" smtClean="0"/>
-              <a:t>eapon: Weapon</a:t>
+              <a:t>weapon: Weapon</a:t>
             </a:r>
           </a:p>
           <a:p>
@@ -3875,7 +3855,6 @@
               <a:rPr lang="en-US" sz="1200" dirty="0" smtClean="0"/>
               <a:t>item: Item</a:t>
             </a:r>
-            <a:endParaRPr lang="en-US" sz="1200" dirty="0" smtClean="0"/>
           </a:p>
           <a:p>
             <a:pPr algn="ctr"/>
@@ -4220,7 +4199,6 @@
               <a:rPr lang="en-US" sz="1200" dirty="0" smtClean="0"/>
               <a:t>Item</a:t>
             </a:r>
-            <a:endParaRPr lang="en-US" sz="1200" dirty="0" smtClean="0"/>
           </a:p>
           <a:p>
             <a:pPr algn="ctr"/>
@@ -4512,7 +4490,7 @@
         </p:nvSpPr>
         <p:spPr>
           <a:xfrm>
-            <a:off x="7358959" y="6162542"/>
+            <a:off x="4979703" y="6304328"/>
             <a:ext cx="1273810" cy="276999"/>
           </a:xfrm>
           <a:prstGeom prst="rect">
@@ -4557,7 +4535,7 @@
         </p:nvSpPr>
         <p:spPr>
           <a:xfrm>
-            <a:off x="5956781" y="7563169"/>
+            <a:off x="3707114" y="7675992"/>
             <a:ext cx="1273810" cy="276999"/>
           </a:xfrm>
           <a:prstGeom prst="rect">
@@ -4605,7 +4583,7 @@
         </p:nvCxnSpPr>
         <p:spPr>
           <a:xfrm flipV="1">
-            <a:off x="3586962" y="7854944"/>
+            <a:off x="1337295" y="7967767"/>
             <a:ext cx="1109345" cy="996786"/>
           </a:xfrm>
           <a:prstGeom prst="straightConnector1">
@@ -4642,7 +4620,7 @@
         </p:nvCxnSpPr>
         <p:spPr>
           <a:xfrm flipV="1">
-            <a:off x="4691862" y="7854946"/>
+            <a:off x="2442195" y="7967769"/>
             <a:ext cx="4445" cy="982845"/>
           </a:xfrm>
           <a:prstGeom prst="straightConnector1">
@@ -4679,7 +4657,7 @@
         </p:nvCxnSpPr>
         <p:spPr>
           <a:xfrm flipH="1" flipV="1">
-            <a:off x="4696307" y="7854944"/>
+            <a:off x="2446640" y="7967767"/>
             <a:ext cx="1100455" cy="982846"/>
           </a:xfrm>
           <a:prstGeom prst="straightConnector1">
@@ -4716,7 +4694,7 @@
         </p:nvCxnSpPr>
         <p:spPr>
           <a:xfrm flipV="1">
-            <a:off x="8750780" y="8360735"/>
+            <a:off x="6891638" y="8167257"/>
             <a:ext cx="723900" cy="728380"/>
           </a:xfrm>
           <a:prstGeom prst="straightConnector1">
@@ -4753,7 +4731,7 @@
         </p:nvCxnSpPr>
         <p:spPr>
           <a:xfrm flipH="1" flipV="1">
-            <a:off x="9474682" y="8360735"/>
+            <a:off x="7615540" y="8167257"/>
             <a:ext cx="871855" cy="729494"/>
           </a:xfrm>
           <a:prstGeom prst="straightConnector1">
@@ -5076,7 +5054,7 @@
         </p:nvSpPr>
         <p:spPr>
           <a:xfrm>
-            <a:off x="4986501" y="7048585"/>
+            <a:off x="2736834" y="7161408"/>
             <a:ext cx="1273810" cy="276999"/>
           </a:xfrm>
           <a:prstGeom prst="rect">
@@ -5124,7 +5102,7 @@
         </p:nvCxnSpPr>
         <p:spPr>
           <a:xfrm rot="16200000" flipV="1">
-            <a:off x="6238957" y="7208439"/>
+            <a:off x="3989290" y="7321262"/>
             <a:ext cx="376084" cy="333375"/>
           </a:xfrm>
           <a:prstGeom prst="bentConnector2">
@@ -5160,7 +5138,7 @@
         </p:nvCxnSpPr>
         <p:spPr>
           <a:xfrm rot="10800000" flipV="1">
-            <a:off x="4696307" y="7187085"/>
+            <a:off x="2446640" y="7299908"/>
             <a:ext cx="290195" cy="390862"/>
           </a:xfrm>
           <a:prstGeom prst="bentConnector2">
@@ -5194,7 +5172,7 @@
         </p:nvSpPr>
         <p:spPr>
           <a:xfrm>
-            <a:off x="3737632" y="7252015"/>
+            <a:off x="1487965" y="7364838"/>
             <a:ext cx="981359" cy="246221"/>
           </a:xfrm>
           <a:prstGeom prst="rect">
@@ -5224,7 +5202,7 @@
         </p:nvSpPr>
         <p:spPr>
           <a:xfrm>
-            <a:off x="6590402" y="7198155"/>
+            <a:off x="4340735" y="7310978"/>
             <a:ext cx="580608" cy="246221"/>
           </a:xfrm>
           <a:prstGeom prst="rect">
@@ -5254,7 +5232,7 @@
         </p:nvSpPr>
         <p:spPr>
           <a:xfrm>
-            <a:off x="4770533" y="8114516"/>
+            <a:off x="2520866" y="8227339"/>
             <a:ext cx="934871" cy="246221"/>
           </a:xfrm>
           <a:prstGeom prst="rect">
@@ -5284,7 +5262,7 @@
         </p:nvSpPr>
         <p:spPr>
           <a:xfrm>
-            <a:off x="4248239" y="8367687"/>
+            <a:off x="1998572" y="8480510"/>
             <a:ext cx="934871" cy="246221"/>
           </a:xfrm>
           <a:prstGeom prst="rect">
@@ -5314,7 +5292,7 @@
         </p:nvSpPr>
         <p:spPr>
           <a:xfrm>
-            <a:off x="3726276" y="8114516"/>
+            <a:off x="1476609" y="8227339"/>
             <a:ext cx="934871" cy="246221"/>
           </a:xfrm>
           <a:prstGeom prst="rect">
@@ -5344,7 +5322,7 @@
         </p:nvSpPr>
         <p:spPr>
           <a:xfrm>
-            <a:off x="9644151" y="8635227"/>
+            <a:off x="7785009" y="8441749"/>
             <a:ext cx="934871" cy="246221"/>
           </a:xfrm>
           <a:prstGeom prst="rect">
@@ -5374,7 +5352,7 @@
         </p:nvSpPr>
         <p:spPr>
           <a:xfrm>
-            <a:off x="8599894" y="8635227"/>
+            <a:off x="6740752" y="8441749"/>
             <a:ext cx="934871" cy="246221"/>
           </a:xfrm>
           <a:prstGeom prst="rect">
@@ -5404,7 +5382,7 @@
         </p:nvSpPr>
         <p:spPr>
           <a:xfrm>
-            <a:off x="10727853" y="8072900"/>
+            <a:off x="8868711" y="7879422"/>
             <a:ext cx="1273810" cy="276999"/>
           </a:xfrm>
           <a:prstGeom prst="rect">
@@ -5449,7 +5427,7 @@
         </p:nvSpPr>
         <p:spPr>
           <a:xfrm>
-            <a:off x="9757573" y="7558316"/>
+            <a:off x="7898431" y="7364838"/>
             <a:ext cx="1273810" cy="276999"/>
           </a:xfrm>
           <a:prstGeom prst="rect">
@@ -5497,7 +5475,7 @@
         </p:nvCxnSpPr>
         <p:spPr>
           <a:xfrm rot="16200000" flipV="1">
-            <a:off x="11010029" y="7718170"/>
+            <a:off x="9150887" y="7524692"/>
             <a:ext cx="376084" cy="333375"/>
           </a:xfrm>
           <a:prstGeom prst="bentConnector2">
@@ -5533,7 +5511,7 @@
         </p:nvCxnSpPr>
         <p:spPr>
           <a:xfrm rot="5400000" flipH="1" flipV="1">
-            <a:off x="9422665" y="7748831"/>
+            <a:off x="7563523" y="7555353"/>
             <a:ext cx="386922" cy="282893"/>
           </a:xfrm>
           <a:prstGeom prst="bentConnector2">
@@ -5567,7 +5545,7 @@
         </p:nvSpPr>
         <p:spPr>
           <a:xfrm>
-            <a:off x="8508705" y="7761746"/>
+            <a:off x="6649563" y="7568268"/>
             <a:ext cx="981359" cy="246221"/>
           </a:xfrm>
           <a:prstGeom prst="rect">
@@ -5597,7 +5575,7 @@
         </p:nvSpPr>
         <p:spPr>
           <a:xfrm>
-            <a:off x="11361474" y="7707886"/>
+            <a:off x="9502332" y="7514408"/>
             <a:ext cx="580608" cy="246221"/>
           </a:xfrm>
           <a:prstGeom prst="rect">

</xml_diff>

<commit_message>
Shifted body to Civilian class
</commit_message>
<xml_diff>
--- a/MM Class Hierarchy.pptx
+++ b/MM Class Hierarchy.pptx
@@ -243,7 +243,7 @@
           <a:p>
             <a:fld id="{334DA47D-D0B1-4FE1-B759-ADBF76074365}" type="datetimeFigureOut">
               <a:rPr lang="en-GB" smtClean="0"/>
-              <a:t>25/02/2015</a:t>
+              <a:t>05/03/2015</a:t>
             </a:fld>
             <a:endParaRPr lang="en-GB"/>
           </a:p>
@@ -413,7 +413,7 @@
           <a:p>
             <a:fld id="{334DA47D-D0B1-4FE1-B759-ADBF76074365}" type="datetimeFigureOut">
               <a:rPr lang="en-GB" smtClean="0"/>
-              <a:t>25/02/2015</a:t>
+              <a:t>05/03/2015</a:t>
             </a:fld>
             <a:endParaRPr lang="en-GB"/>
           </a:p>
@@ -593,7 +593,7 @@
           <a:p>
             <a:fld id="{334DA47D-D0B1-4FE1-B759-ADBF76074365}" type="datetimeFigureOut">
               <a:rPr lang="en-GB" smtClean="0"/>
-              <a:t>25/02/2015</a:t>
+              <a:t>05/03/2015</a:t>
             </a:fld>
             <a:endParaRPr lang="en-GB"/>
           </a:p>
@@ -763,7 +763,7 @@
           <a:p>
             <a:fld id="{334DA47D-D0B1-4FE1-B759-ADBF76074365}" type="datetimeFigureOut">
               <a:rPr lang="en-GB" smtClean="0"/>
-              <a:t>25/02/2015</a:t>
+              <a:t>05/03/2015</a:t>
             </a:fld>
             <a:endParaRPr lang="en-GB"/>
           </a:p>
@@ -1009,7 +1009,7 @@
           <a:p>
             <a:fld id="{334DA47D-D0B1-4FE1-B759-ADBF76074365}" type="datetimeFigureOut">
               <a:rPr lang="en-GB" smtClean="0"/>
-              <a:t>25/02/2015</a:t>
+              <a:t>05/03/2015</a:t>
             </a:fld>
             <a:endParaRPr lang="en-GB"/>
           </a:p>
@@ -1241,7 +1241,7 @@
           <a:p>
             <a:fld id="{334DA47D-D0B1-4FE1-B759-ADBF76074365}" type="datetimeFigureOut">
               <a:rPr lang="en-GB" smtClean="0"/>
-              <a:t>25/02/2015</a:t>
+              <a:t>05/03/2015</a:t>
             </a:fld>
             <a:endParaRPr lang="en-GB"/>
           </a:p>
@@ -1608,7 +1608,7 @@
           <a:p>
             <a:fld id="{334DA47D-D0B1-4FE1-B759-ADBF76074365}" type="datetimeFigureOut">
               <a:rPr lang="en-GB" smtClean="0"/>
-              <a:t>25/02/2015</a:t>
+              <a:t>05/03/2015</a:t>
             </a:fld>
             <a:endParaRPr lang="en-GB"/>
           </a:p>
@@ -1726,7 +1726,7 @@
           <a:p>
             <a:fld id="{334DA47D-D0B1-4FE1-B759-ADBF76074365}" type="datetimeFigureOut">
               <a:rPr lang="en-GB" smtClean="0"/>
-              <a:t>25/02/2015</a:t>
+              <a:t>05/03/2015</a:t>
             </a:fld>
             <a:endParaRPr lang="en-GB"/>
           </a:p>
@@ -1821,7 +1821,7 @@
           <a:p>
             <a:fld id="{334DA47D-D0B1-4FE1-B759-ADBF76074365}" type="datetimeFigureOut">
               <a:rPr lang="en-GB" smtClean="0"/>
-              <a:t>25/02/2015</a:t>
+              <a:t>05/03/2015</a:t>
             </a:fld>
             <a:endParaRPr lang="en-GB"/>
           </a:p>
@@ -2098,7 +2098,7 @@
           <a:p>
             <a:fld id="{334DA47D-D0B1-4FE1-B759-ADBF76074365}" type="datetimeFigureOut">
               <a:rPr lang="en-GB" smtClean="0"/>
-              <a:t>25/02/2015</a:t>
+              <a:t>05/03/2015</a:t>
             </a:fld>
             <a:endParaRPr lang="en-GB"/>
           </a:p>
@@ -2355,7 +2355,7 @@
           <a:p>
             <a:fld id="{334DA47D-D0B1-4FE1-B759-ADBF76074365}" type="datetimeFigureOut">
               <a:rPr lang="en-GB" smtClean="0"/>
-              <a:t>25/02/2015</a:t>
+              <a:t>05/03/2015</a:t>
             </a:fld>
             <a:endParaRPr lang="en-GB"/>
           </a:p>
@@ -2568,7 +2568,7 @@
           <a:p>
             <a:fld id="{334DA47D-D0B1-4FE1-B759-ADBF76074365}" type="datetimeFigureOut">
               <a:rPr lang="en-GB" smtClean="0"/>
-              <a:t>25/02/2015</a:t>
+              <a:t>05/03/2015</a:t>
             </a:fld>
             <a:endParaRPr lang="en-GB"/>
           </a:p>
@@ -6192,6 +6192,36 @@
           </a:fontRef>
         </p:style>
       </p:cxnSp>
+      <p:sp>
+        <p:nvSpPr>
+          <p:cNvPr id="2" name="TextBox 1"/>
+          <p:cNvSpPr txBox="1"/>
+          <p:nvPr/>
+        </p:nvSpPr>
+        <p:spPr>
+          <a:xfrm>
+            <a:off x="568277" y="10551526"/>
+            <a:ext cx="11427872" cy="641842"/>
+          </a:xfrm>
+          <a:prstGeom prst="rect">
+            <a:avLst/>
+          </a:prstGeom>
+          <a:noFill/>
+        </p:spPr>
+        <p:txBody>
+          <a:bodyPr wrap="none" rtlCol="0">
+            <a:spAutoFit/>
+          </a:bodyPr>
+          <a:lstStyle/>
+          <a:p>
+            <a:r>
+              <a:rPr lang="en-US" dirty="0" smtClean="0"/>
+              <a:t>Use Producer-Consumer for spawning of items and weapons</a:t>
+            </a:r>
+            <a:endParaRPr lang="en-GB" dirty="0"/>
+          </a:p>
+        </p:txBody>
+      </p:sp>
     </p:spTree>
     <p:extLst>
       <p:ext uri="{BB962C8B-B14F-4D97-AF65-F5344CB8AC3E}">

</xml_diff>